<commit_message>
Update errors on breech and uterine inversion. Updated about us page.
</commit_message>
<xml_diff>
--- a/docs/assets/presentations/uterine-rupture.pptx
+++ b/docs/assets/presentations/uterine-rupture.pptx
@@ -210,7 +210,7 @@
           <a:p>
             <a:fld id="{974A0CB6-F554-D246-B94C-2F384773A2A8}" type="datetimeFigureOut">
               <a:rPr lang="en-US" smtClean="0"/>
-              <a:t>12/3/20</a:t>
+              <a:t>2/15/21</a:t>
             </a:fld>
             <a:endParaRPr lang="en-US"/>
           </a:p>
@@ -3478,7 +3478,7 @@
           <a:p>
             <a:fld id="{0FD1A97C-E8BC-AD41-AB0D-A270FC1B7CF7}" type="datetimeFigureOut">
               <a:rPr lang="en-US" smtClean="0"/>
-              <a:t>12/3/20</a:t>
+              <a:t>2/15/21</a:t>
             </a:fld>
             <a:endParaRPr lang="en-US"/>
           </a:p>
@@ -3931,34 +3931,6 @@
             <a:r>
               <a:rPr lang="en-US" dirty="0"/>
               <a:t>Uterine Rupture</a:t>
-            </a:r>
-          </a:p>
-        </p:txBody>
-      </p:sp>
-      <p:sp>
-        <p:nvSpPr>
-          <p:cNvPr id="3" name="Subtitle 2">
-            <a:extLst>
-              <a:ext uri="{FF2B5EF4-FFF2-40B4-BE49-F238E27FC236}">
-                <a16:creationId xmlns:a16="http://schemas.microsoft.com/office/drawing/2014/main" id="{93168C09-3200-2843-BD9E-ACAE8C5942A6}"/>
-              </a:ext>
-            </a:extLst>
-          </p:cNvPr>
-          <p:cNvSpPr>
-            <a:spLocks noGrp="1"/>
-          </p:cNvSpPr>
-          <p:nvPr>
-            <p:ph type="subTitle" idx="1"/>
-          </p:nvPr>
-        </p:nvSpPr>
-        <p:spPr/>
-        <p:txBody>
-          <a:bodyPr/>
-          <a:lstStyle/>
-          <a:p>
-            <a:r>
-              <a:rPr lang="en-US" dirty="0"/>
-              <a:t>Insert date</a:t>
             </a:r>
           </a:p>
         </p:txBody>
@@ -6042,6 +6014,25 @@
 </file>
 
 <file path=customXml/item1.xml><?xml version="1.0" encoding="utf-8"?>
+<?mso-contentType ?>
+<FormTemplates xmlns="http://schemas.microsoft.com/sharepoint/v3/contenttype/forms">
+  <Display>DocumentLibraryForm</Display>
+  <Edit>DocumentLibraryForm</Edit>
+  <New>DocumentLibraryForm</New>
+</FormTemplates>
+</file>
+
+<file path=customXml/item2.xml><?xml version="1.0" encoding="utf-8"?>
+<p:properties xmlns:p="http://schemas.microsoft.com/office/2006/metadata/properties" xmlns:xsi="http://www.w3.org/2001/XMLSchema-instance" xmlns:pc="http://schemas.microsoft.com/office/infopath/2007/PartnerControls">
+  <documentManagement>
+    <_DCDateModified xmlns="http://schemas.microsoft.com/sharepoint/v3/fields" xsi:nil="true"/>
+    <IconOverlay xmlns="http://schemas.microsoft.com/sharepoint/v4" xsi:nil="true"/>
+    <_DCDateCreated xmlns="http://schemas.microsoft.com/sharepoint/v3/fields" xsi:nil="true"/>
+  </documentManagement>
+</p:properties>
+</file>
+
+<file path=customXml/item3.xml><?xml version="1.0" encoding="utf-8"?>
 <ct:contentTypeSchema xmlns:ct="http://schemas.microsoft.com/office/2006/metadata/contentType" xmlns:ma="http://schemas.microsoft.com/office/2006/metadata/properties/metaAttributes" ct:_="" ma:_="" ma:contentTypeName="Document" ma:contentTypeID="0x010100106CE4C3112E1849BDAF18BCE277F62A" ma:contentTypeVersion="15" ma:contentTypeDescription="Create a new document." ma:contentTypeScope="" ma:versionID="51faaaf920bb8e58fb17f1522dd70837">
   <xsd:schema xmlns:xsd="http://www.w3.org/2001/XMLSchema" xmlns:xs="http://www.w3.org/2001/XMLSchema" xmlns:p="http://schemas.microsoft.com/office/2006/metadata/properties" xmlns:ns2="70d2c2e9-5e16-4d0d-880c-5519dc70301b" xmlns:ns3="http://schemas.microsoft.com/sharepoint/v3/fields" xmlns:ns4="http://schemas.microsoft.com/sharepoint/v4" xmlns:ns5="e8d620ed-a4bc-482e-9971-5d79728a0321" targetNamespace="http://schemas.microsoft.com/office/2006/metadata/properties" ma:root="true" ma:fieldsID="58d7d9fd77d8cfdb99cf0d8176c8e495" ns2:_="" ns3:_="" ns4:_="" ns5:_="">
     <xsd:import namespace="70d2c2e9-5e16-4d0d-880c-5519dc70301b"/>
@@ -6286,42 +6277,10 @@
 </ct:contentTypeSchema>
 </file>
 
-<file path=customXml/item2.xml><?xml version="1.0" encoding="utf-8"?>
-<p:properties xmlns:p="http://schemas.microsoft.com/office/2006/metadata/properties" xmlns:xsi="http://www.w3.org/2001/XMLSchema-instance" xmlns:pc="http://schemas.microsoft.com/office/infopath/2007/PartnerControls">
-  <documentManagement>
-    <_DCDateModified xmlns="http://schemas.microsoft.com/sharepoint/v3/fields" xsi:nil="true"/>
-    <IconOverlay xmlns="http://schemas.microsoft.com/sharepoint/v4" xsi:nil="true"/>
-    <_DCDateCreated xmlns="http://schemas.microsoft.com/sharepoint/v3/fields" xsi:nil="true"/>
-  </documentManagement>
-</p:properties>
-</file>
-
-<file path=customXml/item3.xml><?xml version="1.0" encoding="utf-8"?>
-<?mso-contentType ?>
-<FormTemplates xmlns="http://schemas.microsoft.com/sharepoint/v3/contenttype/forms">
-  <Display>DocumentLibraryForm</Display>
-  <Edit>DocumentLibraryForm</Edit>
-  <New>DocumentLibraryForm</New>
-</FormTemplates>
-</file>
-
 <file path=customXml/itemProps1.xml><?xml version="1.0" encoding="utf-8"?>
-<ds:datastoreItem xmlns:ds="http://schemas.openxmlformats.org/officeDocument/2006/customXml" ds:itemID="{9F91042E-E5EF-43F9-8B28-EF42035CB9EA}">
+<ds:datastoreItem xmlns:ds="http://schemas.openxmlformats.org/officeDocument/2006/customXml" ds:itemID="{AFB56A61-8C5B-49A9-96CE-AABA47C95305}">
   <ds:schemaRefs>
-    <ds:schemaRef ds:uri="http://schemas.microsoft.com/office/2006/metadata/contentType"/>
-    <ds:schemaRef ds:uri="http://schemas.microsoft.com/office/2006/metadata/properties/metaAttributes"/>
-    <ds:schemaRef ds:uri="http://www.w3.org/2001/XMLSchema"/>
-    <ds:schemaRef ds:uri="http://schemas.microsoft.com/office/2006/metadata/properties"/>
-    <ds:schemaRef ds:uri="70d2c2e9-5e16-4d0d-880c-5519dc70301b"/>
-    <ds:schemaRef ds:uri="http://schemas.microsoft.com/sharepoint/v3/fields"/>
-    <ds:schemaRef ds:uri="http://schemas.microsoft.com/sharepoint/v4"/>
-    <ds:schemaRef ds:uri="e8d620ed-a4bc-482e-9971-5d79728a0321"/>
-    <ds:schemaRef ds:uri="http://schemas.microsoft.com/office/2006/documentManagement/types"/>
-    <ds:schemaRef ds:uri="http://schemas.microsoft.com/office/infopath/2007/PartnerControls"/>
-    <ds:schemaRef ds:uri="http://schemas.openxmlformats.org/package/2006/metadata/core-properties"/>
-    <ds:schemaRef ds:uri="http://purl.org/dc/elements/1.1/"/>
-    <ds:schemaRef ds:uri="http://purl.org/dc/terms/"/>
-    <ds:schemaRef ds:uri="http://schemas.microsoft.com/internal/obd"/>
+    <ds:schemaRef ds:uri="http://schemas.microsoft.com/sharepoint/v3/contenttype/forms"/>
   </ds:schemaRefs>
 </ds:datastoreItem>
 </file>
@@ -6346,9 +6305,22 @@
 </file>
 
 <file path=customXml/itemProps3.xml><?xml version="1.0" encoding="utf-8"?>
-<ds:datastoreItem xmlns:ds="http://schemas.openxmlformats.org/officeDocument/2006/customXml" ds:itemID="{AFB56A61-8C5B-49A9-96CE-AABA47C95305}">
+<ds:datastoreItem xmlns:ds="http://schemas.openxmlformats.org/officeDocument/2006/customXml" ds:itemID="{9F91042E-E5EF-43F9-8B28-EF42035CB9EA}">
   <ds:schemaRefs>
-    <ds:schemaRef ds:uri="http://schemas.microsoft.com/sharepoint/v3/contenttype/forms"/>
+    <ds:schemaRef ds:uri="http://schemas.microsoft.com/office/2006/metadata/contentType"/>
+    <ds:schemaRef ds:uri="http://schemas.microsoft.com/office/2006/metadata/properties/metaAttributes"/>
+    <ds:schemaRef ds:uri="http://www.w3.org/2001/XMLSchema"/>
+    <ds:schemaRef ds:uri="http://schemas.microsoft.com/office/2006/metadata/properties"/>
+    <ds:schemaRef ds:uri="70d2c2e9-5e16-4d0d-880c-5519dc70301b"/>
+    <ds:schemaRef ds:uri="http://schemas.microsoft.com/sharepoint/v3/fields"/>
+    <ds:schemaRef ds:uri="http://schemas.microsoft.com/sharepoint/v4"/>
+    <ds:schemaRef ds:uri="e8d620ed-a4bc-482e-9971-5d79728a0321"/>
+    <ds:schemaRef ds:uri="http://schemas.microsoft.com/office/2006/documentManagement/types"/>
+    <ds:schemaRef ds:uri="http://schemas.microsoft.com/office/infopath/2007/PartnerControls"/>
+    <ds:schemaRef ds:uri="http://schemas.openxmlformats.org/package/2006/metadata/core-properties"/>
+    <ds:schemaRef ds:uri="http://purl.org/dc/elements/1.1/"/>
+    <ds:schemaRef ds:uri="http://purl.org/dc/terms/"/>
+    <ds:schemaRef ds:uri="http://schemas.microsoft.com/internal/obd"/>
   </ds:schemaRefs>
 </ds:datastoreItem>
 </file>
</xml_diff>